<commit_message>
updated MDP and policy iteration, did all captions, added new pic, removed extra images
</commit_message>
<xml_diff>
--- a/journalSwarmControl/pictures/pdf/PotentialField.pptx
+++ b/journalSwarmControl/pictures/pdf/PotentialField.pptx
@@ -288,7 +288,7 @@
           <a:p>
             <a:fld id="{9CBA829A-D9D5-46BA-A2F7-9C69DF31B345}" type="datetimeFigureOut">
               <a:rPr lang="en-US" smtClean="0"/>
-              <a:t>8/3/16</a:t>
+              <a:t>8/8/16</a:t>
             </a:fld>
             <a:endParaRPr lang="en-US"/>
           </a:p>
@@ -458,7 +458,7 @@
           <a:p>
             <a:fld id="{9CBA829A-D9D5-46BA-A2F7-9C69DF31B345}" type="datetimeFigureOut">
               <a:rPr lang="en-US" smtClean="0"/>
-              <a:t>8/3/16</a:t>
+              <a:t>8/8/16</a:t>
             </a:fld>
             <a:endParaRPr lang="en-US"/>
           </a:p>
@@ -638,7 +638,7 @@
           <a:p>
             <a:fld id="{9CBA829A-D9D5-46BA-A2F7-9C69DF31B345}" type="datetimeFigureOut">
               <a:rPr lang="en-US" smtClean="0"/>
-              <a:t>8/3/16</a:t>
+              <a:t>8/8/16</a:t>
             </a:fld>
             <a:endParaRPr lang="en-US"/>
           </a:p>
@@ -808,7 +808,7 @@
           <a:p>
             <a:fld id="{9CBA829A-D9D5-46BA-A2F7-9C69DF31B345}" type="datetimeFigureOut">
               <a:rPr lang="en-US" smtClean="0"/>
-              <a:t>8/3/16</a:t>
+              <a:t>8/8/16</a:t>
             </a:fld>
             <a:endParaRPr lang="en-US"/>
           </a:p>
@@ -1054,7 +1054,7 @@
           <a:p>
             <a:fld id="{9CBA829A-D9D5-46BA-A2F7-9C69DF31B345}" type="datetimeFigureOut">
               <a:rPr lang="en-US" smtClean="0"/>
-              <a:t>8/3/16</a:t>
+              <a:t>8/8/16</a:t>
             </a:fld>
             <a:endParaRPr lang="en-US"/>
           </a:p>
@@ -1342,7 +1342,7 @@
           <a:p>
             <a:fld id="{9CBA829A-D9D5-46BA-A2F7-9C69DF31B345}" type="datetimeFigureOut">
               <a:rPr lang="en-US" smtClean="0"/>
-              <a:t>8/3/16</a:t>
+              <a:t>8/8/16</a:t>
             </a:fld>
             <a:endParaRPr lang="en-US"/>
           </a:p>
@@ -1764,7 +1764,7 @@
           <a:p>
             <a:fld id="{9CBA829A-D9D5-46BA-A2F7-9C69DF31B345}" type="datetimeFigureOut">
               <a:rPr lang="en-US" smtClean="0"/>
-              <a:t>8/3/16</a:t>
+              <a:t>8/8/16</a:t>
             </a:fld>
             <a:endParaRPr lang="en-US"/>
           </a:p>
@@ -1882,7 +1882,7 @@
           <a:p>
             <a:fld id="{9CBA829A-D9D5-46BA-A2F7-9C69DF31B345}" type="datetimeFigureOut">
               <a:rPr lang="en-US" smtClean="0"/>
-              <a:t>8/3/16</a:t>
+              <a:t>8/8/16</a:t>
             </a:fld>
             <a:endParaRPr lang="en-US"/>
           </a:p>
@@ -1977,7 +1977,7 @@
           <a:p>
             <a:fld id="{9CBA829A-D9D5-46BA-A2F7-9C69DF31B345}" type="datetimeFigureOut">
               <a:rPr lang="en-US" smtClean="0"/>
-              <a:t>8/3/16</a:t>
+              <a:t>8/8/16</a:t>
             </a:fld>
             <a:endParaRPr lang="en-US"/>
           </a:p>
@@ -2254,7 +2254,7 @@
           <a:p>
             <a:fld id="{9CBA829A-D9D5-46BA-A2F7-9C69DF31B345}" type="datetimeFigureOut">
               <a:rPr lang="en-US" smtClean="0"/>
-              <a:t>8/3/16</a:t>
+              <a:t>8/8/16</a:t>
             </a:fld>
             <a:endParaRPr lang="en-US"/>
           </a:p>
@@ -2507,7 +2507,7 @@
           <a:p>
             <a:fld id="{9CBA829A-D9D5-46BA-A2F7-9C69DF31B345}" type="datetimeFigureOut">
               <a:rPr lang="en-US" smtClean="0"/>
-              <a:t>8/3/16</a:t>
+              <a:t>8/8/16</a:t>
             </a:fld>
             <a:endParaRPr lang="en-US"/>
           </a:p>
@@ -2720,7 +2720,7 @@
           <a:p>
             <a:fld id="{9CBA829A-D9D5-46BA-A2F7-9C69DF31B345}" type="datetimeFigureOut">
               <a:rPr lang="en-US" smtClean="0"/>
-              <a:t>8/3/16</a:t>
+              <a:t>8/8/16</a:t>
             </a:fld>
             <a:endParaRPr lang="en-US"/>
           </a:p>
@@ -3221,7 +3221,7 @@
       </p:pic>
       <p:pic>
         <p:nvPicPr>
-          <p:cNvPr id="14" name="Picture 9"/>
+          <p:cNvPr id="1026" name="Picture 2"/>
           <p:cNvPicPr>
             <a:picLocks noChangeAspect="1" noChangeArrowheads="1"/>
           </p:cNvPicPr>
@@ -3235,13 +3235,137 @@
               </a:ext>
             </a:extLst>
           </a:blip>
-          <a:srcRect l="466" t="10207" r="54585" b="9874"/>
+          <a:srcRect l="-1" t="10486" r="54470" b="9593"/>
           <a:stretch/>
         </p:blipFill>
         <p:spPr bwMode="auto">
           <a:xfrm>
-            <a:off x="7467600" y="152400"/>
-            <a:ext cx="6850251" cy="6851178"/>
+            <a:off x="14701953" y="150619"/>
+            <a:ext cx="6938847" cy="6851179"/>
+          </a:xfrm>
+          <a:prstGeom prst="rect">
+            <a:avLst/>
+          </a:prstGeom>
+          <a:noFill/>
+          <a:ln>
+            <a:noFill/>
+          </a:ln>
+          <a:effectLst/>
+          <a:extLst>
+            <a:ext uri="{909E8E84-426E-40dd-AFC4-6F175D3DCCD1}">
+              <a14:hiddenFill xmlns:a14="http://schemas.microsoft.com/office/drawing/2010/main">
+                <a:solidFill>
+                  <a:schemeClr val="accent1"/>
+                </a:solidFill>
+              </a14:hiddenFill>
+            </a:ext>
+            <a:ext uri="{91240B29-F687-4f45-9708-019B960494DF}">
+              <a14:hiddenLine xmlns:a14="http://schemas.microsoft.com/office/drawing/2010/main" w="9525">
+                <a:solidFill>
+                  <a:schemeClr val="tx1"/>
+                </a:solidFill>
+                <a:miter lim="800000"/>
+                <a:headEnd/>
+                <a:tailEnd/>
+              </a14:hiddenLine>
+            </a:ext>
+            <a:ext uri="{AF507438-7753-43e0-B8FC-AC1667EBCBE1}">
+              <a14:hiddenEffects xmlns:a14="http://schemas.microsoft.com/office/drawing/2010/main">
+                <a:effectLst>
+                  <a:outerShdw dist="35921" dir="2700000" algn="ctr" rotWithShape="0">
+                    <a:schemeClr val="bg2"/>
+                  </a:outerShdw>
+                </a:effectLst>
+              </a14:hiddenEffects>
+            </a:ext>
+          </a:extLst>
+        </p:spPr>
+      </p:pic>
+      <p:pic>
+        <p:nvPicPr>
+          <p:cNvPr id="1027" name="Picture 3"/>
+          <p:cNvPicPr>
+            <a:picLocks noChangeAspect="1" noChangeArrowheads="1"/>
+          </p:cNvPicPr>
+          <p:nvPr/>
+        </p:nvPicPr>
+        <p:blipFill rotWithShape="1">
+          <a:blip r:embed="rId5">
+            <a:extLst>
+              <a:ext uri="{28A0092B-C50C-407E-A947-70E740481C1C}">
+                <a14:useLocalDpi xmlns:a14="http://schemas.microsoft.com/office/drawing/2010/main" val="0"/>
+              </a:ext>
+            </a:extLst>
+          </a:blip>
+          <a:srcRect l="473" t="10151" r="54696" b="9950"/>
+          <a:stretch/>
+        </p:blipFill>
+        <p:spPr bwMode="auto">
+          <a:xfrm>
+            <a:off x="164838" y="150619"/>
+            <a:ext cx="6832121" cy="6849373"/>
+          </a:xfrm>
+          <a:prstGeom prst="rect">
+            <a:avLst/>
+          </a:prstGeom>
+          <a:noFill/>
+          <a:ln>
+            <a:noFill/>
+          </a:ln>
+          <a:effectLst/>
+          <a:extLst>
+            <a:ext uri="{909E8E84-426E-40dd-AFC4-6F175D3DCCD1}">
+              <a14:hiddenFill xmlns:a14="http://schemas.microsoft.com/office/drawing/2010/main">
+                <a:solidFill>
+                  <a:schemeClr val="accent1"/>
+                </a:solidFill>
+              </a14:hiddenFill>
+            </a:ext>
+            <a:ext uri="{91240B29-F687-4f45-9708-019B960494DF}">
+              <a14:hiddenLine xmlns:a14="http://schemas.microsoft.com/office/drawing/2010/main" w="9525">
+                <a:solidFill>
+                  <a:schemeClr val="tx1"/>
+                </a:solidFill>
+                <a:miter lim="800000"/>
+                <a:headEnd/>
+                <a:tailEnd/>
+              </a14:hiddenLine>
+            </a:ext>
+            <a:ext uri="{AF507438-7753-43e0-B8FC-AC1667EBCBE1}">
+              <a14:hiddenEffects xmlns:a14="http://schemas.microsoft.com/office/drawing/2010/main">
+                <a:effectLst>
+                  <a:outerShdw dist="35921" dir="2700000" algn="ctr" rotWithShape="0">
+                    <a:schemeClr val="bg2"/>
+                  </a:outerShdw>
+                </a:effectLst>
+              </a14:hiddenEffects>
+            </a:ext>
+          </a:extLst>
+        </p:spPr>
+      </p:pic>
+      <p:pic>
+        <p:nvPicPr>
+          <p:cNvPr id="1028" name="Picture 4"/>
+          <p:cNvPicPr>
+            <a:picLocks noChangeAspect="1" noChangeArrowheads="1"/>
+          </p:cNvPicPr>
+          <p:nvPr/>
+        </p:nvPicPr>
+        <p:blipFill rotWithShape="1">
+          <a:blip r:embed="rId6">
+            <a:extLst>
+              <a:ext uri="{28A0092B-C50C-407E-A947-70E740481C1C}">
+                <a14:useLocalDpi xmlns:a14="http://schemas.microsoft.com/office/drawing/2010/main" val="0"/>
+              </a:ext>
+            </a:extLst>
+          </a:blip>
+          <a:srcRect l="442" t="10519" r="54440" b="9688"/>
+          <a:stretch/>
+        </p:blipFill>
+        <p:spPr bwMode="auto">
+          <a:xfrm>
+            <a:off x="7442039" y="150619"/>
+            <a:ext cx="6875812" cy="6840187"/>
           </a:xfrm>
           <a:prstGeom prst="rect">
             <a:avLst/>

</xml_diff>